<commit_message>
add: update -> correct typo in slide 14
</commit_message>
<xml_diff>
--- a/202224051100_stone.pptx
+++ b/202224051100_stone.pptx
@@ -260,7 +260,7 @@
           <a:p>
             <a:fld id="{39607C32-4867-44F9-A6C4-DFE53A52F5D4}" type="datetimeFigureOut">
               <a:rPr lang="pt-BR" smtClean="0"/>
-              <a:t>23/05/2022</a:t>
+              <a:t>24/05/2022</a:t>
             </a:fld>
             <a:endParaRPr lang="pt-BR"/>
           </a:p>
@@ -430,7 +430,7 @@
           <a:p>
             <a:fld id="{39607C32-4867-44F9-A6C4-DFE53A52F5D4}" type="datetimeFigureOut">
               <a:rPr lang="pt-BR" smtClean="0"/>
-              <a:t>23/05/2022</a:t>
+              <a:t>24/05/2022</a:t>
             </a:fld>
             <a:endParaRPr lang="pt-BR"/>
           </a:p>
@@ -610,7 +610,7 @@
           <a:p>
             <a:fld id="{39607C32-4867-44F9-A6C4-DFE53A52F5D4}" type="datetimeFigureOut">
               <a:rPr lang="pt-BR" smtClean="0"/>
-              <a:t>23/05/2022</a:t>
+              <a:t>24/05/2022</a:t>
             </a:fld>
             <a:endParaRPr lang="pt-BR"/>
           </a:p>
@@ -780,7 +780,7 @@
           <a:p>
             <a:fld id="{39607C32-4867-44F9-A6C4-DFE53A52F5D4}" type="datetimeFigureOut">
               <a:rPr lang="pt-BR" smtClean="0"/>
-              <a:t>23/05/2022</a:t>
+              <a:t>24/05/2022</a:t>
             </a:fld>
             <a:endParaRPr lang="pt-BR"/>
           </a:p>
@@ -1026,7 +1026,7 @@
           <a:p>
             <a:fld id="{39607C32-4867-44F9-A6C4-DFE53A52F5D4}" type="datetimeFigureOut">
               <a:rPr lang="pt-BR" smtClean="0"/>
-              <a:t>23/05/2022</a:t>
+              <a:t>24/05/2022</a:t>
             </a:fld>
             <a:endParaRPr lang="pt-BR"/>
           </a:p>
@@ -1258,7 +1258,7 @@
           <a:p>
             <a:fld id="{39607C32-4867-44F9-A6C4-DFE53A52F5D4}" type="datetimeFigureOut">
               <a:rPr lang="pt-BR" smtClean="0"/>
-              <a:t>23/05/2022</a:t>
+              <a:t>24/05/2022</a:t>
             </a:fld>
             <a:endParaRPr lang="pt-BR"/>
           </a:p>
@@ -1625,7 +1625,7 @@
           <a:p>
             <a:fld id="{39607C32-4867-44F9-A6C4-DFE53A52F5D4}" type="datetimeFigureOut">
               <a:rPr lang="pt-BR" smtClean="0"/>
-              <a:t>23/05/2022</a:t>
+              <a:t>24/05/2022</a:t>
             </a:fld>
             <a:endParaRPr lang="pt-BR"/>
           </a:p>
@@ -1743,7 +1743,7 @@
           <a:p>
             <a:fld id="{39607C32-4867-44F9-A6C4-DFE53A52F5D4}" type="datetimeFigureOut">
               <a:rPr lang="pt-BR" smtClean="0"/>
-              <a:t>23/05/2022</a:t>
+              <a:t>24/05/2022</a:t>
             </a:fld>
             <a:endParaRPr lang="pt-BR"/>
           </a:p>
@@ -1838,7 +1838,7 @@
           <a:p>
             <a:fld id="{39607C32-4867-44F9-A6C4-DFE53A52F5D4}" type="datetimeFigureOut">
               <a:rPr lang="pt-BR" smtClean="0"/>
-              <a:t>23/05/2022</a:t>
+              <a:t>24/05/2022</a:t>
             </a:fld>
             <a:endParaRPr lang="pt-BR"/>
           </a:p>
@@ -2115,7 +2115,7 @@
           <a:p>
             <a:fld id="{39607C32-4867-44F9-A6C4-DFE53A52F5D4}" type="datetimeFigureOut">
               <a:rPr lang="pt-BR" smtClean="0"/>
-              <a:t>23/05/2022</a:t>
+              <a:t>24/05/2022</a:t>
             </a:fld>
             <a:endParaRPr lang="pt-BR"/>
           </a:p>
@@ -2368,7 +2368,7 @@
           <a:p>
             <a:fld id="{39607C32-4867-44F9-A6C4-DFE53A52F5D4}" type="datetimeFigureOut">
               <a:rPr lang="pt-BR" smtClean="0"/>
-              <a:t>23/05/2022</a:t>
+              <a:t>24/05/2022</a:t>
             </a:fld>
             <a:endParaRPr lang="pt-BR"/>
           </a:p>
@@ -2581,7 +2581,7 @@
           <a:p>
             <a:fld id="{39607C32-4867-44F9-A6C4-DFE53A52F5D4}" type="datetimeFigureOut">
               <a:rPr lang="pt-BR" smtClean="0"/>
-              <a:t>23/05/2022</a:t>
+              <a:t>24/05/2022</a:t>
             </a:fld>
             <a:endParaRPr lang="pt-BR"/>
           </a:p>
@@ -6189,7 +6189,7 @@
         <p:spPr>
           <a:xfrm>
             <a:off x="748147" y="212913"/>
-            <a:ext cx="5636821" cy="400110"/>
+            <a:ext cx="6210592" cy="400110"/>
           </a:xfrm>
           <a:prstGeom prst="rect">
             <a:avLst/>
@@ -6203,7 +6203,7 @@
           <a:lstStyle/>
           <a:p>
             <a:r>
-              <a:rPr lang="en-US" sz="2000" b="1" dirty="0" err="1" smtClean="0">
+              <a:rPr lang="en-US" sz="2000" b="1" dirty="0" err="1">
                 <a:solidFill>
                   <a:srgbClr val="14A43D"/>
                 </a:solidFill>
@@ -6211,7 +6211,7 @@
               <a:t>Qual</a:t>
             </a:r>
             <a:r>
-              <a:rPr lang="en-US" sz="2000" b="1" dirty="0" smtClean="0">
+              <a:rPr lang="en-US" sz="2000" b="1" dirty="0">
                 <a:solidFill>
                   <a:srgbClr val="14A43D"/>
                 </a:solidFill>
@@ -6219,15 +6219,47 @@
               <a:t> o </a:t>
             </a:r>
             <a:r>
-              <a:rPr lang="en-US" sz="2000" b="1" dirty="0" err="1" smtClean="0">
-                <a:solidFill>
-                  <a:srgbClr val="14A43D"/>
-                </a:solidFill>
-              </a:rPr>
-              <a:t>comportamento</a:t>
-            </a:r>
-            <a:r>
-              <a:rPr lang="en-US" sz="2000" b="1" dirty="0" smtClean="0">
+              <a:rPr lang="en-US" sz="2000" b="1" dirty="0" err="1">
+                <a:solidFill>
+                  <a:srgbClr val="14A43D"/>
+                </a:solidFill>
+              </a:rPr>
+              <a:t>perfil</a:t>
+            </a:r>
+            <a:r>
+              <a:rPr lang="en-US" sz="2000" b="1" dirty="0">
+                <a:solidFill>
+                  <a:srgbClr val="14A43D"/>
+                </a:solidFill>
+              </a:rPr>
+              <a:t> das </a:t>
+            </a:r>
+            <a:r>
+              <a:rPr lang="en-US" sz="2000" b="1" dirty="0" err="1">
+                <a:solidFill>
+                  <a:srgbClr val="14A43D"/>
+                </a:solidFill>
+              </a:rPr>
+              <a:t>transações</a:t>
+            </a:r>
+            <a:r>
+              <a:rPr lang="en-US" sz="2000" b="1" dirty="0">
+                <a:solidFill>
+                  <a:srgbClr val="14A43D"/>
+                </a:solidFill>
+              </a:rPr>
+              <a:t> que </a:t>
+            </a:r>
+            <a:r>
+              <a:rPr lang="en-US" sz="2000" b="1" dirty="0" err="1">
+                <a:solidFill>
+                  <a:srgbClr val="14A43D"/>
+                </a:solidFill>
+              </a:rPr>
+              <a:t>retornam</a:t>
+            </a:r>
+            <a:r>
+              <a:rPr lang="en-US" sz="2000" b="1" dirty="0">
                 <a:solidFill>
                   <a:srgbClr val="14A43D"/>
                 </a:solidFill>
@@ -6235,36 +6267,12 @@
               <a:t> </a:t>
             </a:r>
             <a:r>
-              <a:rPr lang="en-US" sz="2000" b="1" dirty="0" err="1" smtClean="0">
-                <a:solidFill>
-                  <a:srgbClr val="14A43D"/>
-                </a:solidFill>
-              </a:rPr>
-              <a:t>transacional</a:t>
-            </a:r>
-            <a:r>
-              <a:rPr lang="en-US" sz="2000" b="1" dirty="0" smtClean="0">
-                <a:solidFill>
-                  <a:srgbClr val="14A43D"/>
-                </a:solidFill>
-              </a:rPr>
-              <a:t> do </a:t>
-            </a:r>
-            <a:r>
-              <a:rPr lang="en-US" sz="2000" b="1" dirty="0" err="1" smtClean="0">
-                <a:solidFill>
-                  <a:srgbClr val="14A43D"/>
-                </a:solidFill>
-              </a:rPr>
-              <a:t>cliente</a:t>
-            </a:r>
-            <a:r>
-              <a:rPr lang="en-US" sz="2000" b="1" i="1" dirty="0" smtClean="0">
-                <a:solidFill>
-                  <a:srgbClr val="14A43D"/>
-                </a:solidFill>
-              </a:rPr>
-              <a:t>?</a:t>
+              <a:rPr lang="en-US" sz="2000" b="1" i="1" dirty="0">
+                <a:solidFill>
+                  <a:srgbClr val="14A43D"/>
+                </a:solidFill>
+              </a:rPr>
+              <a:t>chargeback?</a:t>
             </a:r>
             <a:endParaRPr lang="en-US" sz="2000" b="1" i="1" dirty="0">
               <a:solidFill>

</xml_diff>